<commit_message>
updated with Marsh comments
</commit_message>
<xml_diff>
--- a/aaea_nutr_pricing_poster.pptx
+++ b/aaea_nutr_pricing_poster.pptx
@@ -53,7 +53,7 @@
       </p:grpSpPr>
       <p:sp>
         <p:nvSpPr>
-          <p:cNvPr id="21" name="PlaceHolder 1"/>
+          <p:cNvPr id="23" name="PlaceHolder 1"/>
           <p:cNvSpPr>
             <a:spLocks noGrp="1"/>
           </p:cNvSpPr>
@@ -84,7 +84,7 @@
       </p:sp>
       <p:sp>
         <p:nvSpPr>
-          <p:cNvPr id="22" name="PlaceHolder 2"/>
+          <p:cNvPr id="24" name="PlaceHolder 2"/>
           <p:cNvSpPr>
             <a:spLocks noGrp="1"/>
           </p:cNvSpPr>
@@ -114,7 +114,7 @@
       </p:sp>
       <p:sp>
         <p:nvSpPr>
-          <p:cNvPr id="23" name="PlaceHolder 3"/>
+          <p:cNvPr id="25" name="PlaceHolder 3"/>
           <p:cNvSpPr>
             <a:spLocks noGrp="1"/>
           </p:cNvSpPr>
@@ -166,7 +166,7 @@
       </p:grpSpPr>
       <p:sp>
         <p:nvSpPr>
-          <p:cNvPr id="24" name="PlaceHolder 1"/>
+          <p:cNvPr id="26" name="PlaceHolder 1"/>
           <p:cNvSpPr>
             <a:spLocks noGrp="1"/>
           </p:cNvSpPr>
@@ -197,7 +197,7 @@
       </p:sp>
       <p:sp>
         <p:nvSpPr>
-          <p:cNvPr id="25" name="PlaceHolder 2"/>
+          <p:cNvPr id="27" name="PlaceHolder 2"/>
           <p:cNvSpPr>
             <a:spLocks noGrp="1"/>
           </p:cNvSpPr>
@@ -227,7 +227,7 @@
       </p:sp>
       <p:sp>
         <p:nvSpPr>
-          <p:cNvPr id="26" name="PlaceHolder 3"/>
+          <p:cNvPr id="28" name="PlaceHolder 3"/>
           <p:cNvSpPr>
             <a:spLocks noGrp="1"/>
           </p:cNvSpPr>
@@ -257,7 +257,7 @@
       </p:sp>
       <p:sp>
         <p:nvSpPr>
-          <p:cNvPr id="27" name="PlaceHolder 4"/>
+          <p:cNvPr id="29" name="PlaceHolder 4"/>
           <p:cNvSpPr>
             <a:spLocks noGrp="1"/>
           </p:cNvSpPr>
@@ -287,7 +287,7 @@
       </p:sp>
       <p:sp>
         <p:nvSpPr>
-          <p:cNvPr id="28" name="PlaceHolder 5"/>
+          <p:cNvPr id="30" name="PlaceHolder 5"/>
           <p:cNvSpPr>
             <a:spLocks noGrp="1"/>
           </p:cNvSpPr>
@@ -339,7 +339,7 @@
       </p:grpSpPr>
       <p:sp>
         <p:nvSpPr>
-          <p:cNvPr id="29" name="PlaceHolder 1"/>
+          <p:cNvPr id="31" name="PlaceHolder 1"/>
           <p:cNvSpPr>
             <a:spLocks noGrp="1"/>
           </p:cNvSpPr>
@@ -370,7 +370,7 @@
       </p:sp>
       <p:sp>
         <p:nvSpPr>
-          <p:cNvPr id="30" name="PlaceHolder 2"/>
+          <p:cNvPr id="32" name="PlaceHolder 2"/>
           <p:cNvSpPr>
             <a:spLocks noGrp="1"/>
           </p:cNvSpPr>
@@ -400,7 +400,7 @@
       </p:sp>
       <p:sp>
         <p:nvSpPr>
-          <p:cNvPr id="31" name="PlaceHolder 3"/>
+          <p:cNvPr id="33" name="PlaceHolder 3"/>
           <p:cNvSpPr>
             <a:spLocks noGrp="1"/>
           </p:cNvSpPr>
@@ -430,7 +430,7 @@
       </p:sp>
       <p:sp>
         <p:nvSpPr>
-          <p:cNvPr id="32" name="PlaceHolder 4"/>
+          <p:cNvPr id="34" name="PlaceHolder 4"/>
           <p:cNvSpPr>
             <a:spLocks noGrp="1"/>
           </p:cNvSpPr>
@@ -460,7 +460,7 @@
       </p:sp>
       <p:sp>
         <p:nvSpPr>
-          <p:cNvPr id="33" name="PlaceHolder 5"/>
+          <p:cNvPr id="35" name="PlaceHolder 5"/>
           <p:cNvSpPr>
             <a:spLocks noGrp="1"/>
           </p:cNvSpPr>
@@ -490,7 +490,7 @@
       </p:sp>
       <p:sp>
         <p:nvSpPr>
-          <p:cNvPr id="34" name="PlaceHolder 6"/>
+          <p:cNvPr id="36" name="PlaceHolder 6"/>
           <p:cNvSpPr>
             <a:spLocks noGrp="1"/>
           </p:cNvSpPr>
@@ -520,7 +520,7 @@
       </p:sp>
       <p:sp>
         <p:nvSpPr>
-          <p:cNvPr id="35" name="PlaceHolder 7"/>
+          <p:cNvPr id="37" name="PlaceHolder 7"/>
           <p:cNvSpPr>
             <a:spLocks noGrp="1"/>
           </p:cNvSpPr>
@@ -572,7 +572,7 @@
       </p:grpSpPr>
       <p:sp>
         <p:nvSpPr>
-          <p:cNvPr id="0" name="PlaceHolder 1"/>
+          <p:cNvPr id="2" name="PlaceHolder 1"/>
           <p:cNvSpPr>
             <a:spLocks noGrp="1"/>
           </p:cNvSpPr>
@@ -603,7 +603,7 @@
       </p:sp>
       <p:sp>
         <p:nvSpPr>
-          <p:cNvPr id="1" name="PlaceHolder 2"/>
+          <p:cNvPr id="3" name="PlaceHolder 2"/>
           <p:cNvSpPr>
             <a:spLocks noGrp="1"/>
           </p:cNvSpPr>
@@ -656,7 +656,7 @@
       </p:grpSpPr>
       <p:sp>
         <p:nvSpPr>
-          <p:cNvPr id="2" name="PlaceHolder 1"/>
+          <p:cNvPr id="4" name="PlaceHolder 1"/>
           <p:cNvSpPr>
             <a:spLocks noGrp="1"/>
           </p:cNvSpPr>
@@ -687,7 +687,7 @@
       </p:sp>
       <p:sp>
         <p:nvSpPr>
-          <p:cNvPr id="3" name="PlaceHolder 2"/>
+          <p:cNvPr id="5" name="PlaceHolder 2"/>
           <p:cNvSpPr>
             <a:spLocks noGrp="1"/>
           </p:cNvSpPr>
@@ -739,7 +739,7 @@
       </p:grpSpPr>
       <p:sp>
         <p:nvSpPr>
-          <p:cNvPr id="4" name="PlaceHolder 1"/>
+          <p:cNvPr id="6" name="PlaceHolder 1"/>
           <p:cNvSpPr>
             <a:spLocks noGrp="1"/>
           </p:cNvSpPr>
@@ -770,7 +770,7 @@
       </p:sp>
       <p:sp>
         <p:nvSpPr>
-          <p:cNvPr id="5" name="PlaceHolder 2"/>
+          <p:cNvPr id="7" name="PlaceHolder 2"/>
           <p:cNvSpPr>
             <a:spLocks noGrp="1"/>
           </p:cNvSpPr>
@@ -800,7 +800,7 @@
       </p:sp>
       <p:sp>
         <p:nvSpPr>
-          <p:cNvPr id="6" name="PlaceHolder 3"/>
+          <p:cNvPr id="8" name="PlaceHolder 3"/>
           <p:cNvSpPr>
             <a:spLocks noGrp="1"/>
           </p:cNvSpPr>
@@ -852,7 +852,7 @@
       </p:grpSpPr>
       <p:sp>
         <p:nvSpPr>
-          <p:cNvPr id="7" name="PlaceHolder 1"/>
+          <p:cNvPr id="9" name="PlaceHolder 1"/>
           <p:cNvSpPr>
             <a:spLocks noGrp="1"/>
           </p:cNvSpPr>
@@ -905,7 +905,7 @@
       </p:grpSpPr>
       <p:sp>
         <p:nvSpPr>
-          <p:cNvPr id="8" name="PlaceHolder 1"/>
+          <p:cNvPr id="10" name="PlaceHolder 1"/>
           <p:cNvSpPr>
             <a:spLocks noGrp="1"/>
           </p:cNvSpPr>
@@ -958,7 +958,7 @@
       </p:grpSpPr>
       <p:sp>
         <p:nvSpPr>
-          <p:cNvPr id="9" name="PlaceHolder 1"/>
+          <p:cNvPr id="11" name="PlaceHolder 1"/>
           <p:cNvSpPr>
             <a:spLocks noGrp="1"/>
           </p:cNvSpPr>
@@ -989,7 +989,7 @@
       </p:sp>
       <p:sp>
         <p:nvSpPr>
-          <p:cNvPr id="10" name="PlaceHolder 2"/>
+          <p:cNvPr id="12" name="PlaceHolder 2"/>
           <p:cNvSpPr>
             <a:spLocks noGrp="1"/>
           </p:cNvSpPr>
@@ -1019,7 +1019,7 @@
       </p:sp>
       <p:sp>
         <p:nvSpPr>
-          <p:cNvPr id="11" name="PlaceHolder 3"/>
+          <p:cNvPr id="13" name="PlaceHolder 3"/>
           <p:cNvSpPr>
             <a:spLocks noGrp="1"/>
           </p:cNvSpPr>
@@ -1049,7 +1049,7 @@
       </p:sp>
       <p:sp>
         <p:nvSpPr>
-          <p:cNvPr id="12" name="PlaceHolder 4"/>
+          <p:cNvPr id="14" name="PlaceHolder 4"/>
           <p:cNvSpPr>
             <a:spLocks noGrp="1"/>
           </p:cNvSpPr>
@@ -1101,7 +1101,7 @@
       </p:grpSpPr>
       <p:sp>
         <p:nvSpPr>
-          <p:cNvPr id="13" name="PlaceHolder 1"/>
+          <p:cNvPr id="15" name="PlaceHolder 1"/>
           <p:cNvSpPr>
             <a:spLocks noGrp="1"/>
           </p:cNvSpPr>
@@ -1132,7 +1132,7 @@
       </p:sp>
       <p:sp>
         <p:nvSpPr>
-          <p:cNvPr id="14" name="PlaceHolder 2"/>
+          <p:cNvPr id="16" name="PlaceHolder 2"/>
           <p:cNvSpPr>
             <a:spLocks noGrp="1"/>
           </p:cNvSpPr>
@@ -1162,7 +1162,7 @@
       </p:sp>
       <p:sp>
         <p:nvSpPr>
-          <p:cNvPr id="15" name="PlaceHolder 3"/>
+          <p:cNvPr id="17" name="PlaceHolder 3"/>
           <p:cNvSpPr>
             <a:spLocks noGrp="1"/>
           </p:cNvSpPr>
@@ -1192,7 +1192,7 @@
       </p:sp>
       <p:sp>
         <p:nvSpPr>
-          <p:cNvPr id="16" name="PlaceHolder 4"/>
+          <p:cNvPr id="18" name="PlaceHolder 4"/>
           <p:cNvSpPr>
             <a:spLocks noGrp="1"/>
           </p:cNvSpPr>
@@ -1244,7 +1244,7 @@
       </p:grpSpPr>
       <p:sp>
         <p:nvSpPr>
-          <p:cNvPr id="17" name="PlaceHolder 1"/>
+          <p:cNvPr id="19" name="PlaceHolder 1"/>
           <p:cNvSpPr>
             <a:spLocks noGrp="1"/>
           </p:cNvSpPr>
@@ -1275,7 +1275,7 @@
       </p:sp>
       <p:sp>
         <p:nvSpPr>
-          <p:cNvPr id="18" name="PlaceHolder 2"/>
+          <p:cNvPr id="20" name="PlaceHolder 2"/>
           <p:cNvSpPr>
             <a:spLocks noGrp="1"/>
           </p:cNvSpPr>
@@ -1305,7 +1305,7 @@
       </p:sp>
       <p:sp>
         <p:nvSpPr>
-          <p:cNvPr id="19" name="PlaceHolder 3"/>
+          <p:cNvPr id="21" name="PlaceHolder 3"/>
           <p:cNvSpPr>
             <a:spLocks noGrp="1"/>
           </p:cNvSpPr>
@@ -1335,7 +1335,7 @@
       </p:sp>
       <p:sp>
         <p:nvSpPr>
-          <p:cNvPr id="20" name="PlaceHolder 4"/>
+          <p:cNvPr id="22" name="PlaceHolder 4"/>
           <p:cNvSpPr>
             <a:spLocks noGrp="1"/>
           </p:cNvSpPr>
@@ -1392,6 +1392,426 @@
           <a:chExt cx="0" cy="0"/>
         </a:xfrm>
       </p:grpSpPr>
+      <p:sp>
+        <p:nvSpPr>
+          <p:cNvPr id="0" name="PlaceHolder 1"/>
+          <p:cNvSpPr>
+            <a:spLocks noGrp="1"/>
+          </p:cNvSpPr>
+          <p:nvPr>
+            <p:ph type="title"/>
+          </p:nvPr>
+        </p:nvSpPr>
+        <p:spPr>
+          <a:xfrm>
+            <a:off x="1645920" y="1751040"/>
+            <a:ext cx="29626200" cy="7329240"/>
+          </a:xfrm>
+          <a:prstGeom prst="rect">
+            <a:avLst/>
+          </a:prstGeom>
+        </p:spPr>
+        <p:txBody>
+          <a:bodyPr lIns="0" rIns="0" tIns="0" bIns="0" anchor="ctr">
+            <a:noAutofit/>
+          </a:bodyPr>
+          <a:p>
+            <a:pPr algn="ctr"/>
+            <a:r>
+              <a:rPr b="0" lang="en-US" sz="4400" spc="-1" strike="noStrike">
+                <a:latin typeface="Arial"/>
+              </a:rPr>
+              <a:t>C</a:t>
+            </a:r>
+            <a:r>
+              <a:rPr b="0" lang="en-US" sz="4400" spc="-1" strike="noStrike">
+                <a:latin typeface="Arial"/>
+              </a:rPr>
+              <a:t>l</a:t>
+            </a:r>
+            <a:r>
+              <a:rPr b="0" lang="en-US" sz="4400" spc="-1" strike="noStrike">
+                <a:latin typeface="Arial"/>
+              </a:rPr>
+              <a:t>i</a:t>
+            </a:r>
+            <a:r>
+              <a:rPr b="0" lang="en-US" sz="4400" spc="-1" strike="noStrike">
+                <a:latin typeface="Arial"/>
+              </a:rPr>
+              <a:t>c</a:t>
+            </a:r>
+            <a:r>
+              <a:rPr b="0" lang="en-US" sz="4400" spc="-1" strike="noStrike">
+                <a:latin typeface="Arial"/>
+              </a:rPr>
+              <a:t>k</a:t>
+            </a:r>
+            <a:r>
+              <a:rPr b="0" lang="en-US" sz="4400" spc="-1" strike="noStrike">
+                <a:latin typeface="Arial"/>
+              </a:rPr>
+              <a:t> </a:t>
+            </a:r>
+            <a:r>
+              <a:rPr b="0" lang="en-US" sz="4400" spc="-1" strike="noStrike">
+                <a:latin typeface="Arial"/>
+              </a:rPr>
+              <a:t>t</a:t>
+            </a:r>
+            <a:r>
+              <a:rPr b="0" lang="en-US" sz="4400" spc="-1" strike="noStrike">
+                <a:latin typeface="Arial"/>
+              </a:rPr>
+              <a:t>o</a:t>
+            </a:r>
+            <a:r>
+              <a:rPr b="0" lang="en-US" sz="4400" spc="-1" strike="noStrike">
+                <a:latin typeface="Arial"/>
+              </a:rPr>
+              <a:t> </a:t>
+            </a:r>
+            <a:r>
+              <a:rPr b="0" lang="en-US" sz="4400" spc="-1" strike="noStrike">
+                <a:latin typeface="Arial"/>
+              </a:rPr>
+              <a:t>e</a:t>
+            </a:r>
+            <a:r>
+              <a:rPr b="0" lang="en-US" sz="4400" spc="-1" strike="noStrike">
+                <a:latin typeface="Arial"/>
+              </a:rPr>
+              <a:t>d</a:t>
+            </a:r>
+            <a:r>
+              <a:rPr b="0" lang="en-US" sz="4400" spc="-1" strike="noStrike">
+                <a:latin typeface="Arial"/>
+              </a:rPr>
+              <a:t>i</a:t>
+            </a:r>
+            <a:r>
+              <a:rPr b="0" lang="en-US" sz="4400" spc="-1" strike="noStrike">
+                <a:latin typeface="Arial"/>
+              </a:rPr>
+              <a:t>t</a:t>
+            </a:r>
+            <a:r>
+              <a:rPr b="0" lang="en-US" sz="4400" spc="-1" strike="noStrike">
+                <a:latin typeface="Arial"/>
+              </a:rPr>
+              <a:t> </a:t>
+            </a:r>
+            <a:r>
+              <a:rPr b="0" lang="en-US" sz="4400" spc="-1" strike="noStrike">
+                <a:latin typeface="Arial"/>
+              </a:rPr>
+              <a:t>t</a:t>
+            </a:r>
+            <a:r>
+              <a:rPr b="0" lang="en-US" sz="4400" spc="-1" strike="noStrike">
+                <a:latin typeface="Arial"/>
+              </a:rPr>
+              <a:t>h</a:t>
+            </a:r>
+            <a:r>
+              <a:rPr b="0" lang="en-US" sz="4400" spc="-1" strike="noStrike">
+                <a:latin typeface="Arial"/>
+              </a:rPr>
+              <a:t>e</a:t>
+            </a:r>
+            <a:r>
+              <a:rPr b="0" lang="en-US" sz="4400" spc="-1" strike="noStrike">
+                <a:latin typeface="Arial"/>
+              </a:rPr>
+              <a:t> </a:t>
+            </a:r>
+            <a:r>
+              <a:rPr b="0" lang="en-US" sz="4400" spc="-1" strike="noStrike">
+                <a:latin typeface="Arial"/>
+              </a:rPr>
+              <a:t>t</a:t>
+            </a:r>
+            <a:r>
+              <a:rPr b="0" lang="en-US" sz="4400" spc="-1" strike="noStrike">
+                <a:latin typeface="Arial"/>
+              </a:rPr>
+              <a:t>i</a:t>
+            </a:r>
+            <a:r>
+              <a:rPr b="0" lang="en-US" sz="4400" spc="-1" strike="noStrike">
+                <a:latin typeface="Arial"/>
+              </a:rPr>
+              <a:t>t</a:t>
+            </a:r>
+            <a:r>
+              <a:rPr b="0" lang="en-US" sz="4400" spc="-1" strike="noStrike">
+                <a:latin typeface="Arial"/>
+              </a:rPr>
+              <a:t>l</a:t>
+            </a:r>
+            <a:r>
+              <a:rPr b="0" lang="en-US" sz="4400" spc="-1" strike="noStrike">
+                <a:latin typeface="Arial"/>
+              </a:rPr>
+              <a:t>e</a:t>
+            </a:r>
+            <a:r>
+              <a:rPr b="0" lang="en-US" sz="4400" spc="-1" strike="noStrike">
+                <a:latin typeface="Arial"/>
+              </a:rPr>
+              <a:t> </a:t>
+            </a:r>
+            <a:r>
+              <a:rPr b="0" lang="en-US" sz="4400" spc="-1" strike="noStrike">
+                <a:latin typeface="Arial"/>
+              </a:rPr>
+              <a:t>t</a:t>
+            </a:r>
+            <a:r>
+              <a:rPr b="0" lang="en-US" sz="4400" spc="-1" strike="noStrike">
+                <a:latin typeface="Arial"/>
+              </a:rPr>
+              <a:t>e</a:t>
+            </a:r>
+            <a:r>
+              <a:rPr b="0" lang="en-US" sz="4400" spc="-1" strike="noStrike">
+                <a:latin typeface="Arial"/>
+              </a:rPr>
+              <a:t>x</a:t>
+            </a:r>
+            <a:r>
+              <a:rPr b="0" lang="en-US" sz="4400" spc="-1" strike="noStrike">
+                <a:latin typeface="Arial"/>
+              </a:rPr>
+              <a:t>t</a:t>
+            </a:r>
+            <a:r>
+              <a:rPr b="0" lang="en-US" sz="4400" spc="-1" strike="noStrike">
+                <a:latin typeface="Arial"/>
+              </a:rPr>
+              <a:t> </a:t>
+            </a:r>
+            <a:r>
+              <a:rPr b="0" lang="en-US" sz="4400" spc="-1" strike="noStrike">
+                <a:latin typeface="Arial"/>
+              </a:rPr>
+              <a:t>f</a:t>
+            </a:r>
+            <a:r>
+              <a:rPr b="0" lang="en-US" sz="4400" spc="-1" strike="noStrike">
+                <a:latin typeface="Arial"/>
+              </a:rPr>
+              <a:t>o</a:t>
+            </a:r>
+            <a:r>
+              <a:rPr b="0" lang="en-US" sz="4400" spc="-1" strike="noStrike">
+                <a:latin typeface="Arial"/>
+              </a:rPr>
+              <a:t>r</a:t>
+            </a:r>
+            <a:r>
+              <a:rPr b="0" lang="en-US" sz="4400" spc="-1" strike="noStrike">
+                <a:latin typeface="Arial"/>
+              </a:rPr>
+              <a:t>m</a:t>
+            </a:r>
+            <a:r>
+              <a:rPr b="0" lang="en-US" sz="4400" spc="-1" strike="noStrike">
+                <a:latin typeface="Arial"/>
+              </a:rPr>
+              <a:t>a</a:t>
+            </a:r>
+            <a:r>
+              <a:rPr b="0" lang="en-US" sz="4400" spc="-1" strike="noStrike">
+                <a:latin typeface="Arial"/>
+              </a:rPr>
+              <a:t>t</a:t>
+            </a:r>
+            <a:endParaRPr b="0" lang="en-US" sz="4400" spc="-1" strike="noStrike">
+              <a:latin typeface="Arial"/>
+            </a:endParaRPr>
+          </a:p>
+        </p:txBody>
+      </p:sp>
+      <p:sp>
+        <p:nvSpPr>
+          <p:cNvPr id="1" name="PlaceHolder 2"/>
+          <p:cNvSpPr>
+            <a:spLocks noGrp="1"/>
+          </p:cNvSpPr>
+          <p:nvPr>
+            <p:ph type="body"/>
+          </p:nvPr>
+        </p:nvSpPr>
+        <p:spPr>
+          <a:xfrm>
+            <a:off x="1645920" y="10270440"/>
+            <a:ext cx="29626200" cy="25456320"/>
+          </a:xfrm>
+          <a:prstGeom prst="rect">
+            <a:avLst/>
+          </a:prstGeom>
+        </p:spPr>
+        <p:txBody>
+          <a:bodyPr lIns="0" rIns="0" tIns="0" bIns="0">
+            <a:normAutofit/>
+          </a:bodyPr>
+          <a:p>
+            <a:pPr marL="432000" indent="-324000">
+              <a:spcBef>
+                <a:spcPts val="1417"/>
+              </a:spcBef>
+              <a:buClr>
+                <a:srgbClr val="000000"/>
+              </a:buClr>
+              <a:buSzPct val="45000"/>
+              <a:buFont typeface="Wingdings" charset="2"/>
+              <a:buChar char=""/>
+            </a:pPr>
+            <a:r>
+              <a:rPr b="0" lang="en-US" sz="3200" spc="-1" strike="noStrike">
+                <a:latin typeface="Arial"/>
+              </a:rPr>
+              <a:t>Click to edit the outline text format</a:t>
+            </a:r>
+            <a:endParaRPr b="0" lang="en-US" sz="3200" spc="-1" strike="noStrike">
+              <a:latin typeface="Arial"/>
+            </a:endParaRPr>
+          </a:p>
+          <a:p>
+            <a:pPr lvl="1" marL="864000" indent="-324000">
+              <a:spcBef>
+                <a:spcPts val="1134"/>
+              </a:spcBef>
+              <a:buClr>
+                <a:srgbClr val="000000"/>
+              </a:buClr>
+              <a:buSzPct val="75000"/>
+              <a:buFont typeface="Symbol" charset="2"/>
+              <a:buChar char=""/>
+            </a:pPr>
+            <a:r>
+              <a:rPr b="0" lang="en-US" sz="2800" spc="-1" strike="noStrike">
+                <a:latin typeface="Arial"/>
+              </a:rPr>
+              <a:t>Second Outline Level</a:t>
+            </a:r>
+            <a:endParaRPr b="0" lang="en-US" sz="2800" spc="-1" strike="noStrike">
+              <a:latin typeface="Arial"/>
+            </a:endParaRPr>
+          </a:p>
+          <a:p>
+            <a:pPr lvl="2" marL="1296000" indent="-288000">
+              <a:spcBef>
+                <a:spcPts val="850"/>
+              </a:spcBef>
+              <a:buClr>
+                <a:srgbClr val="000000"/>
+              </a:buClr>
+              <a:buSzPct val="45000"/>
+              <a:buFont typeface="Wingdings" charset="2"/>
+              <a:buChar char=""/>
+            </a:pPr>
+            <a:r>
+              <a:rPr b="0" lang="en-US" sz="2400" spc="-1" strike="noStrike">
+                <a:latin typeface="Arial"/>
+              </a:rPr>
+              <a:t>Third Outline Level</a:t>
+            </a:r>
+            <a:endParaRPr b="0" lang="en-US" sz="2400" spc="-1" strike="noStrike">
+              <a:latin typeface="Arial"/>
+            </a:endParaRPr>
+          </a:p>
+          <a:p>
+            <a:pPr lvl="3" marL="1728000" indent="-216000">
+              <a:spcBef>
+                <a:spcPts val="567"/>
+              </a:spcBef>
+              <a:buClr>
+                <a:srgbClr val="000000"/>
+              </a:buClr>
+              <a:buSzPct val="75000"/>
+              <a:buFont typeface="Symbol" charset="2"/>
+              <a:buChar char=""/>
+            </a:pPr>
+            <a:r>
+              <a:rPr b="0" lang="en-US" sz="2000" spc="-1" strike="noStrike">
+                <a:latin typeface="Arial"/>
+              </a:rPr>
+              <a:t>Fourth Outline Level</a:t>
+            </a:r>
+            <a:endParaRPr b="0" lang="en-US" sz="2000" spc="-1" strike="noStrike">
+              <a:latin typeface="Arial"/>
+            </a:endParaRPr>
+          </a:p>
+          <a:p>
+            <a:pPr lvl="4" marL="2160000" indent="-216000">
+              <a:spcBef>
+                <a:spcPts val="283"/>
+              </a:spcBef>
+              <a:buClr>
+                <a:srgbClr val="000000"/>
+              </a:buClr>
+              <a:buSzPct val="45000"/>
+              <a:buFont typeface="Wingdings" charset="2"/>
+              <a:buChar char=""/>
+            </a:pPr>
+            <a:r>
+              <a:rPr b="0" lang="en-US" sz="2000" spc="-1" strike="noStrike">
+                <a:latin typeface="Arial"/>
+              </a:rPr>
+              <a:t>Fifth Outline Level</a:t>
+            </a:r>
+            <a:endParaRPr b="0" lang="en-US" sz="2000" spc="-1" strike="noStrike">
+              <a:latin typeface="Arial"/>
+            </a:endParaRPr>
+          </a:p>
+          <a:p>
+            <a:pPr lvl="5" marL="2592000" indent="-216000">
+              <a:spcBef>
+                <a:spcPts val="283"/>
+              </a:spcBef>
+              <a:buClr>
+                <a:srgbClr val="000000"/>
+              </a:buClr>
+              <a:buSzPct val="45000"/>
+              <a:buFont typeface="Wingdings" charset="2"/>
+              <a:buChar char=""/>
+            </a:pPr>
+            <a:r>
+              <a:rPr b="0" lang="en-US" sz="2000" spc="-1" strike="noStrike">
+                <a:latin typeface="Arial"/>
+              </a:rPr>
+              <a:t>Sixth Outline Level</a:t>
+            </a:r>
+            <a:endParaRPr b="0" lang="en-US" sz="2000" spc="-1" strike="noStrike">
+              <a:latin typeface="Arial"/>
+            </a:endParaRPr>
+          </a:p>
+          <a:p>
+            <a:pPr lvl="6" marL="3024000" indent="-216000">
+              <a:spcBef>
+                <a:spcPts val="283"/>
+              </a:spcBef>
+              <a:buClr>
+                <a:srgbClr val="000000"/>
+              </a:buClr>
+              <a:buSzPct val="45000"/>
+              <a:buFont typeface="Wingdings" charset="2"/>
+              <a:buChar char=""/>
+            </a:pPr>
+            <a:r>
+              <a:rPr b="0" lang="en-US" sz="2000" spc="-1" strike="noStrike">
+                <a:latin typeface="Arial"/>
+              </a:rPr>
+              <a:t>Seventh Outline Level</a:t>
+            </a:r>
+            <a:endParaRPr b="0" lang="en-US" sz="2000" spc="-1" strike="noStrike">
+              <a:latin typeface="Arial"/>
+            </a:endParaRPr>
+          </a:p>
+        </p:txBody>
+      </p:sp>
     </p:spTree>
   </p:cSld>
   <p:clrMap bg1="lt1" bg2="lt2" tx1="dk1" tx2="dk2" accent1="accent1" accent2="accent2" accent3="accent3" accent4="accent4" accent5="accent5" accent6="accent6" hlink="hlink" folHlink="folHlink"/>
@@ -1431,14 +1851,14 @@
       </p:grpSpPr>
       <p:sp>
         <p:nvSpPr>
-          <p:cNvPr id="36" name="CustomShape 1"/>
+          <p:cNvPr id="38" name="CustomShape 1"/>
           <p:cNvSpPr/>
           <p:nvPr/>
         </p:nvSpPr>
         <p:spPr>
           <a:xfrm>
             <a:off x="0" y="0"/>
-            <a:ext cx="32916600" cy="4570200"/>
+            <a:ext cx="32916240" cy="4569840"/>
           </a:xfrm>
           <a:prstGeom prst="rect">
             <a:avLst/>
@@ -1467,14 +1887,14 @@
       </p:sp>
       <p:sp>
         <p:nvSpPr>
-          <p:cNvPr id="37" name="CustomShape 2"/>
+          <p:cNvPr id="39" name="CustomShape 2"/>
           <p:cNvSpPr/>
           <p:nvPr/>
         </p:nvSpPr>
         <p:spPr>
           <a:xfrm>
-            <a:off x="831240" y="652320"/>
-            <a:ext cx="25525440" cy="2029680"/>
+            <a:off x="831240" y="651960"/>
+            <a:ext cx="25525080" cy="2029680"/>
           </a:xfrm>
           <a:prstGeom prst="rect">
             <a:avLst/>
@@ -1518,14 +1938,14 @@
       </p:sp>
       <p:sp>
         <p:nvSpPr>
-          <p:cNvPr id="38" name="CustomShape 3"/>
+          <p:cNvPr id="40" name="CustomShape 3"/>
           <p:cNvSpPr/>
           <p:nvPr/>
         </p:nvSpPr>
         <p:spPr>
           <a:xfrm>
             <a:off x="918000" y="2961000"/>
-            <a:ext cx="1370520" cy="360"/>
+            <a:ext cx="1370160" cy="360"/>
           </a:xfrm>
           <a:custGeom>
             <a:avLst/>
@@ -1560,14 +1980,14 @@
       </p:sp>
       <p:sp>
         <p:nvSpPr>
-          <p:cNvPr id="39" name="CustomShape 4"/>
+          <p:cNvPr id="41" name="CustomShape 4"/>
           <p:cNvSpPr/>
           <p:nvPr/>
         </p:nvSpPr>
         <p:spPr>
           <a:xfrm>
             <a:off x="867960" y="3268080"/>
-            <a:ext cx="25525440" cy="456480"/>
+            <a:ext cx="25525080" cy="456480"/>
           </a:xfrm>
           <a:prstGeom prst="rect">
             <a:avLst/>
@@ -1614,14 +2034,14 @@
       </p:sp>
       <p:sp>
         <p:nvSpPr>
-          <p:cNvPr id="40" name="CustomShape 5"/>
+          <p:cNvPr id="42" name="CustomShape 5"/>
           <p:cNvSpPr/>
           <p:nvPr/>
         </p:nvSpPr>
         <p:spPr>
           <a:xfrm>
             <a:off x="918000" y="5491080"/>
-            <a:ext cx="9745560" cy="8304840"/>
+            <a:ext cx="9745200" cy="8304840"/>
           </a:xfrm>
           <a:prstGeom prst="rect">
             <a:avLst/>
@@ -1724,7 +2144,7 @@
                 <a:latin typeface="Times New Roman"/>
                 <a:ea typeface="DejaVu Sans"/>
               </a:rPr>
-              <a:t>Smallholder agriculture provides the primary supply of subsistence and community market foodstuffs in rural western Kenya. Using household bovine, goat, and sheep livestock health observations we analyze the effect livestock illness has on macronutrient consumption costs. </a:t>
+              <a:t>Smallholder agriculture provides the primary supply of subsistence and community market foodstuffs in rural western Kenya. Using household bovine, goat, and sheep livestock health observations we analyze the effect livestock illness has on macronutrient consumption prices. </a:t>
             </a:r>
             <a:endParaRPr b="0" lang="en-US" sz="3000" spc="-1" strike="noStrike">
               <a:latin typeface="Arial"/>
@@ -1734,14 +2154,14 @@
       </p:sp>
       <p:sp>
         <p:nvSpPr>
-          <p:cNvPr id="41" name="CustomShape 6"/>
+          <p:cNvPr id="43" name="CustomShape 6"/>
           <p:cNvSpPr/>
           <p:nvPr/>
         </p:nvSpPr>
         <p:spPr>
           <a:xfrm>
             <a:off x="731520" y="14717520"/>
-            <a:ext cx="9727920" cy="17840880"/>
+            <a:ext cx="9727560" cy="17840880"/>
           </a:xfrm>
           <a:prstGeom prst="rect">
             <a:avLst/>
@@ -1966,7 +2386,7 @@
                 <a:latin typeface="Arial"/>
                 <a:ea typeface="DejaVu Sans"/>
               </a:rPr>
-              <a:t>Agriculture production losses from livestock illness directly influence energy availability. Further, livestock illness is empirically shown to increase the costs of available energy consumption in terms of macronutrient shadow prices. </a:t>
+              <a:t>Agriculture production losses from livestock illness directly influence energy availability. Further, livestock illness is empirically shown to increase the costs of available energy consumption in terms of macronutrient shadow prices.  </a:t>
             </a:r>
             <a:endParaRPr b="0" lang="en-US" sz="2400" spc="-1" strike="noStrike">
               <a:latin typeface="Arial"/>
@@ -1996,7 +2416,7 @@
                 <a:latin typeface="Arial"/>
                 <a:ea typeface="DejaVu Sans"/>
               </a:rPr>
-              <a:t>Empirical marginal effect estimates of livestock illness on nutrient consumption critically informs policy decision-making in undernourished, developing areas. </a:t>
+              <a:t>Increasing livestock health lowers the costs of nutrient consumption, making consumption more attainable in constrained-resource environments. </a:t>
             </a:r>
             <a:endParaRPr b="0" lang="en-US" sz="2400" spc="-1" strike="noStrike">
               <a:latin typeface="Arial"/>
@@ -2026,7 +2446,7 @@
                 <a:latin typeface="Arial"/>
                 <a:ea typeface="DejaVu Sans"/>
               </a:rPr>
-              <a:t>Increasing livestock health lowers the costs of nutrient consumption, making consumption more attainable in constrained-resource environments. </a:t>
+              <a:t>Empirical marginal effect estimates of livestock illness on nutrient consumption critically informs policy decision-making in undernourished, developing areas.</a:t>
             </a:r>
             <a:endParaRPr b="0" lang="en-US" sz="2400" spc="-1" strike="noStrike">
               <a:latin typeface="Arial"/>
@@ -2036,14 +2456,14 @@
       </p:sp>
       <p:sp>
         <p:nvSpPr>
-          <p:cNvPr id="42" name="CustomShape 7"/>
+          <p:cNvPr id="44" name="CustomShape 7"/>
           <p:cNvSpPr/>
           <p:nvPr/>
         </p:nvSpPr>
         <p:spPr>
           <a:xfrm>
             <a:off x="11568240" y="5537880"/>
-            <a:ext cx="20983680" cy="14257800"/>
+            <a:ext cx="20983320" cy="7482240"/>
           </a:xfrm>
           <a:prstGeom prst="rect">
             <a:avLst/>
@@ -2230,7 +2650,7 @@
             </a:endParaRPr>
           </a:p>
           <a:p>
-            <a:pPr marL="343080" indent="-341280">
+            <a:pPr marL="343080" indent="-340920">
               <a:lnSpc>
                 <a:spcPts val="2999"/>
               </a:lnSpc>
@@ -2371,7 +2791,7 @@
             </a:endParaRPr>
           </a:p>
           <a:p>
-            <a:pPr marL="343080" indent="-341280">
+            <a:pPr marL="343080" indent="-340920">
               <a:lnSpc>
                 <a:spcPts val="2999"/>
               </a:lnSpc>
@@ -2481,422 +2901,11 @@
               <a:latin typeface="Arial"/>
             </a:endParaRPr>
           </a:p>
-          <a:p>
-            <a:pPr>
-              <a:lnSpc>
-                <a:spcPts val="2999"/>
-              </a:lnSpc>
-              <a:spcBef>
-                <a:spcPts val="1233"/>
-              </a:spcBef>
-              <a:spcAft>
-                <a:spcPts val="567"/>
-              </a:spcAft>
-            </a:pPr>
-            <a:endParaRPr b="0" lang="en-US" sz="2600" spc="-1" strike="noStrike">
-              <a:latin typeface="Arial"/>
-            </a:endParaRPr>
-          </a:p>
-          <a:p>
-            <a:pPr algn="ctr">
-              <a:lnSpc>
-                <a:spcPts val="2999"/>
-              </a:lnSpc>
-              <a:spcBef>
-                <a:spcPts val="1800"/>
-              </a:spcBef>
-            </a:pPr>
-            <a:r>
-              <a:rPr b="0" lang="en-US" sz="3000" spc="-1" strike="noStrike" cap="all">
-                <a:solidFill>
-                  <a:srgbClr val="a80432"/>
-                </a:solidFill>
-                <a:latin typeface="Times New Roman"/>
-                <a:ea typeface="DejaVu Sans"/>
-              </a:rPr>
-              <a:t>Livestock illness effects on nutrient shadow prices</a:t>
-            </a:r>
-            <a:endParaRPr b="0" lang="en-US" sz="3000" spc="-1" strike="noStrike">
-              <a:latin typeface="Arial"/>
-            </a:endParaRPr>
-          </a:p>
-          <a:p>
-            <a:pPr algn="ctr">
-              <a:lnSpc>
-                <a:spcPts val="2999"/>
-              </a:lnSpc>
-              <a:spcBef>
-                <a:spcPts val="1800"/>
-              </a:spcBef>
-            </a:pPr>
-            <a:endParaRPr b="0" lang="en-US" sz="3000" spc="-1" strike="noStrike">
-              <a:latin typeface="Arial"/>
-            </a:endParaRPr>
-          </a:p>
-          <a:p>
-            <a:pPr>
-              <a:lnSpc>
-                <a:spcPts val="2999"/>
-              </a:lnSpc>
-              <a:spcBef>
-                <a:spcPts val="1800"/>
-              </a:spcBef>
-            </a:pPr>
-            <a:endParaRPr b="0" lang="en-US" sz="3000" spc="-1" strike="noStrike">
-              <a:latin typeface="Arial"/>
-            </a:endParaRPr>
-          </a:p>
-          <a:p>
-            <a:pPr>
-              <a:lnSpc>
-                <a:spcPts val="2999"/>
-              </a:lnSpc>
-              <a:spcBef>
-                <a:spcPts val="1800"/>
-              </a:spcBef>
-            </a:pPr>
-            <a:endParaRPr b="0" lang="en-US" sz="3000" spc="-1" strike="noStrike">
-              <a:latin typeface="Arial"/>
-            </a:endParaRPr>
-          </a:p>
-          <a:p>
-            <a:pPr marL="343080" indent="-341280">
-              <a:lnSpc>
-                <a:spcPts val="2999"/>
-              </a:lnSpc>
-              <a:spcBef>
-                <a:spcPts val="1800"/>
-              </a:spcBef>
-              <a:buClr>
-                <a:srgbClr val="231f20"/>
-              </a:buClr>
-              <a:buFont typeface="Arial"/>
-              <a:buChar char="•"/>
-            </a:pPr>
-            <a:r>
-              <a:rPr b="0" i="1" lang="en-US" sz="2600" spc="-1" strike="noStrike">
-                <a:solidFill>
-                  <a:srgbClr val="231f20"/>
-                </a:solidFill>
-                <a:latin typeface="Times New Roman"/>
-                <a:ea typeface="DejaVu Sans"/>
-              </a:rPr>
-              <a:t>L</a:t>
-            </a:r>
-            <a:r>
-              <a:rPr b="0" lang="en-US" sz="2600" spc="-1" strike="noStrike">
-                <a:solidFill>
-                  <a:srgbClr val="231f20"/>
-                </a:solidFill>
-                <a:latin typeface="Times New Roman"/>
-                <a:ea typeface="DejaVu Sans"/>
-              </a:rPr>
-              <a:t> represents village </a:t>
-            </a:r>
-            <a:r>
-              <a:rPr b="0" i="1" lang="en-US" sz="2600" spc="-1" strike="noStrike">
-                <a:solidFill>
-                  <a:srgbClr val="231f20"/>
-                </a:solidFill>
-                <a:latin typeface="Times New Roman"/>
-                <a:ea typeface="DejaVu Sans"/>
-              </a:rPr>
-              <a:t>v</a:t>
-            </a:r>
-            <a:r>
-              <a:rPr b="0" lang="en-US" sz="2600" spc="-1" strike="noStrike">
-                <a:solidFill>
-                  <a:srgbClr val="231f20"/>
-                </a:solidFill>
-                <a:latin typeface="Times New Roman"/>
-                <a:ea typeface="DejaVu Sans"/>
-              </a:rPr>
-              <a:t> average livestock illness occurrence in month </a:t>
-            </a:r>
-            <a:r>
-              <a:rPr b="0" i="1" lang="en-US" sz="2600" spc="-1" strike="noStrike">
-                <a:solidFill>
-                  <a:srgbClr val="231f20"/>
-                </a:solidFill>
-                <a:latin typeface="Times New Roman"/>
-                <a:ea typeface="DejaVu Sans"/>
-              </a:rPr>
-              <a:t>m</a:t>
-            </a:r>
-            <a:endParaRPr b="0" lang="en-US" sz="2600" spc="-1" strike="noStrike">
-              <a:latin typeface="Arial"/>
-            </a:endParaRPr>
-          </a:p>
-          <a:p>
-            <a:pPr marL="343080" indent="-341280">
-              <a:lnSpc>
-                <a:spcPts val="2999"/>
-              </a:lnSpc>
-              <a:spcBef>
-                <a:spcPts val="1800"/>
-              </a:spcBef>
-              <a:buClr>
-                <a:srgbClr val="231f20"/>
-              </a:buClr>
-              <a:buFont typeface="Arial"/>
-              <a:buChar char="•"/>
-            </a:pPr>
-            <a:r>
-              <a:rPr b="0" i="1" lang="en-US" sz="2600" spc="-1" strike="noStrike">
-                <a:solidFill>
-                  <a:srgbClr val="231f20"/>
-                </a:solidFill>
-                <a:latin typeface="Times New Roman"/>
-                <a:ea typeface="DejaVu Sans"/>
-              </a:rPr>
-              <a:t>THM</a:t>
-            </a:r>
-            <a:r>
-              <a:rPr b="0" lang="en-US" sz="2600" spc="-1" strike="noStrike">
-                <a:solidFill>
-                  <a:srgbClr val="231f20"/>
-                </a:solidFill>
-                <a:latin typeface="Times New Roman"/>
-                <a:ea typeface="DejaVu Sans"/>
-              </a:rPr>
-              <a:t> represents total household members in household </a:t>
-            </a:r>
-            <a:r>
-              <a:rPr b="0" i="1" lang="en-US" sz="2600" spc="-1" strike="noStrike">
-                <a:solidFill>
-                  <a:srgbClr val="231f20"/>
-                </a:solidFill>
-                <a:latin typeface="Times New Roman"/>
-                <a:ea typeface="DejaVu Sans"/>
-              </a:rPr>
-              <a:t>h</a:t>
-            </a:r>
-            <a:endParaRPr b="0" lang="en-US" sz="2600" spc="-1" strike="noStrike">
-              <a:latin typeface="Arial"/>
-            </a:endParaRPr>
-          </a:p>
-          <a:p>
-            <a:pPr marL="343080" indent="-341280">
-              <a:lnSpc>
-                <a:spcPts val="2999"/>
-              </a:lnSpc>
-              <a:spcBef>
-                <a:spcPts val="1800"/>
-              </a:spcBef>
-              <a:buClr>
-                <a:srgbClr val="231f20"/>
-              </a:buClr>
-              <a:buFont typeface="Arial"/>
-              <a:buChar char="•"/>
-            </a:pPr>
-            <a:r>
-              <a:rPr b="0" i="1" lang="en-US" sz="2600" spc="-1" strike="noStrike">
-                <a:solidFill>
-                  <a:srgbClr val="231f20"/>
-                </a:solidFill>
-                <a:latin typeface="Times New Roman"/>
-                <a:ea typeface="Times New Roman"/>
-              </a:rPr>
-              <a:t>ε </a:t>
-            </a:r>
-            <a:r>
-              <a:rPr b="0" lang="en-US" sz="2600" spc="-1" strike="noStrike">
-                <a:solidFill>
-                  <a:srgbClr val="231f20"/>
-                </a:solidFill>
-                <a:latin typeface="Times New Roman"/>
-                <a:ea typeface="Times New Roman"/>
-              </a:rPr>
-              <a:t>represent the stochastic error component for household </a:t>
-            </a:r>
-            <a:r>
-              <a:rPr b="0" i="1" lang="en-US" sz="2600" spc="-1" strike="noStrike">
-                <a:solidFill>
-                  <a:srgbClr val="231f20"/>
-                </a:solidFill>
-                <a:latin typeface="Times New Roman"/>
-                <a:ea typeface="Times New Roman"/>
-              </a:rPr>
-              <a:t>h</a:t>
-            </a:r>
-            <a:endParaRPr b="0" lang="en-US" sz="2600" spc="-1" strike="noStrike">
-              <a:latin typeface="Arial"/>
-            </a:endParaRPr>
-          </a:p>
-          <a:p>
-            <a:pPr marL="343080" indent="-341280">
-              <a:lnSpc>
-                <a:spcPts val="2999"/>
-              </a:lnSpc>
-              <a:spcBef>
-                <a:spcPts val="1800"/>
-              </a:spcBef>
-              <a:buClr>
-                <a:srgbClr val="231f20"/>
-              </a:buClr>
-              <a:buFont typeface="Arial"/>
-              <a:buChar char="•"/>
-            </a:pPr>
-            <a:r>
-              <a:rPr b="0" i="1" lang="en-US" sz="2600" spc="-1" strike="noStrike">
-                <a:solidFill>
-                  <a:srgbClr val="231f20"/>
-                </a:solidFill>
-                <a:latin typeface="Times New Roman"/>
-                <a:ea typeface="Times New Roman"/>
-              </a:rPr>
-              <a:t>β</a:t>
-            </a:r>
-            <a:r>
-              <a:rPr b="0" i="1" lang="en-US" sz="2600" spc="-1" strike="noStrike" baseline="-33000">
-                <a:solidFill>
-                  <a:srgbClr val="231f20"/>
-                </a:solidFill>
-                <a:latin typeface="Times New Roman"/>
-                <a:ea typeface="Times New Roman"/>
-              </a:rPr>
-              <a:t>1</a:t>
-            </a:r>
-            <a:r>
-              <a:rPr b="0" i="1" lang="en-US" sz="2600" spc="-1" strike="noStrike">
-                <a:solidFill>
-                  <a:srgbClr val="231f20"/>
-                </a:solidFill>
-                <a:latin typeface="Times New Roman"/>
-                <a:ea typeface="Times New Roman"/>
-              </a:rPr>
-              <a:t> </a:t>
-            </a:r>
-            <a:r>
-              <a:rPr b="0" lang="en-US" sz="2600" spc="-1" strike="noStrike">
-                <a:solidFill>
-                  <a:srgbClr val="231f20"/>
-                </a:solidFill>
-                <a:latin typeface="Times New Roman"/>
-                <a:ea typeface="Times New Roman"/>
-              </a:rPr>
-              <a:t>represents the estimable parameter of interest for livestock health effects on the shadow price </a:t>
-            </a:r>
-            <a:r>
-              <a:rPr b="0" i="1" lang="en-US" sz="2600" spc="-1" strike="noStrike">
-                <a:solidFill>
-                  <a:srgbClr val="231f20"/>
-                </a:solidFill>
-                <a:latin typeface="Times New Roman"/>
-                <a:ea typeface="Times New Roman"/>
-              </a:rPr>
-              <a:t>P</a:t>
-            </a:r>
-            <a:r>
-              <a:rPr b="0" lang="en-US" sz="2600" spc="-1" strike="noStrike" baseline="-33000">
-                <a:solidFill>
-                  <a:srgbClr val="231f20"/>
-                </a:solidFill>
-                <a:latin typeface="Times New Roman"/>
-                <a:ea typeface="Times New Roman"/>
-              </a:rPr>
-              <a:t>n,h</a:t>
-            </a:r>
-            <a:r>
-              <a:rPr b="0" lang="en-US" sz="2600" spc="-1" strike="noStrike">
-                <a:solidFill>
-                  <a:srgbClr val="231f20"/>
-                </a:solidFill>
-                <a:latin typeface="Times New Roman"/>
-                <a:ea typeface="Times New Roman"/>
-              </a:rPr>
-              <a:t> for nutrient </a:t>
-            </a:r>
-            <a:r>
-              <a:rPr b="0" i="1" lang="en-US" sz="2600" spc="-1" strike="noStrike">
-                <a:solidFill>
-                  <a:srgbClr val="231f20"/>
-                </a:solidFill>
-                <a:latin typeface="Times New Roman"/>
-                <a:ea typeface="Times New Roman"/>
-              </a:rPr>
-              <a:t>n</a:t>
-            </a:r>
-            <a:r>
-              <a:rPr b="0" lang="en-US" sz="2600" spc="-1" strike="noStrike">
-                <a:solidFill>
-                  <a:srgbClr val="231f20"/>
-                </a:solidFill>
-                <a:latin typeface="Times New Roman"/>
-                <a:ea typeface="Times New Roman"/>
-              </a:rPr>
-              <a:t> in household </a:t>
-            </a:r>
-            <a:r>
-              <a:rPr b="0" i="1" lang="en-US" sz="2600" spc="-1" strike="noStrike">
-                <a:solidFill>
-                  <a:srgbClr val="231f20"/>
-                </a:solidFill>
-                <a:latin typeface="Times New Roman"/>
-                <a:ea typeface="Times New Roman"/>
-              </a:rPr>
-              <a:t>h</a:t>
-            </a:r>
-            <a:endParaRPr b="0" lang="en-US" sz="2600" spc="-1" strike="noStrike">
-              <a:latin typeface="Arial"/>
-            </a:endParaRPr>
-          </a:p>
-          <a:p>
-            <a:pPr marL="343080" indent="-341280">
-              <a:lnSpc>
-                <a:spcPts val="2999"/>
-              </a:lnSpc>
-              <a:spcBef>
-                <a:spcPts val="1800"/>
-              </a:spcBef>
-              <a:buClr>
-                <a:srgbClr val="231f20"/>
-              </a:buClr>
-              <a:buFont typeface="Arial"/>
-              <a:buChar char="•"/>
-            </a:pPr>
-            <a:r>
-              <a:rPr b="0" i="1" lang="en-US" sz="2600" spc="-1" strike="noStrike">
-                <a:solidFill>
-                  <a:srgbClr val="231f20"/>
-                </a:solidFill>
-                <a:latin typeface="Times New Roman"/>
-                <a:ea typeface="Times New Roman"/>
-              </a:rPr>
-              <a:t>Cov(β) </a:t>
-            </a:r>
-            <a:r>
-              <a:rPr b="0" lang="en-US" sz="2600" spc="-1" strike="noStrike">
-                <a:solidFill>
-                  <a:srgbClr val="231f20"/>
-                </a:solidFill>
-                <a:latin typeface="Times New Roman"/>
-                <a:ea typeface="Times New Roman"/>
-              </a:rPr>
-              <a:t>is estimated using the Newey and West (1987) Heteroskedastic and Autocorrelation Consistent Covariance Estimator</a:t>
-            </a:r>
-            <a:endParaRPr b="0" lang="en-US" sz="2600" spc="-1" strike="noStrike">
-              <a:latin typeface="Arial"/>
-            </a:endParaRPr>
-          </a:p>
-          <a:p>
-            <a:pPr>
-              <a:lnSpc>
-                <a:spcPts val="2999"/>
-              </a:lnSpc>
-              <a:spcBef>
-                <a:spcPts val="1800"/>
-              </a:spcBef>
-            </a:pPr>
-            <a:endParaRPr b="0" lang="en-US" sz="2600" spc="-1" strike="noStrike">
-              <a:latin typeface="Arial"/>
-            </a:endParaRPr>
-          </a:p>
         </p:txBody>
       </p:sp>
       <p:pic>
         <p:nvPicPr>
-          <p:cNvPr id="43" name="Picture 34" descr=""/>
+          <p:cNvPr id="45" name="Picture 34" descr=""/>
           <p:cNvPicPr/>
           <p:nvPr/>
         </p:nvPicPr>
@@ -2907,7 +2916,7 @@
         <p:spPr>
           <a:xfrm>
             <a:off x="27296280" y="888840"/>
-            <a:ext cx="4682520" cy="2873880"/>
+            <a:ext cx="4682160" cy="2873520"/>
           </a:xfrm>
           <a:prstGeom prst="rect">
             <a:avLst/>
@@ -2919,21 +2928,21 @@
       </p:pic>
       <p:grpSp>
         <p:nvGrpSpPr>
-          <p:cNvPr id="44" name="Group 8"/>
+          <p:cNvPr id="46" name="Group 8"/>
           <p:cNvGrpSpPr/>
           <p:nvPr/>
         </p:nvGrpSpPr>
         <p:grpSpPr>
           <a:xfrm>
-            <a:off x="-35387280" y="-23590800"/>
-            <a:ext cx="11795040" cy="5896800"/>
-            <a:chOff x="-35387280" y="-23590800"/>
-            <a:chExt cx="11795040" cy="5896800"/>
+            <a:off x="-35386920" y="-23590440"/>
+            <a:ext cx="11794680" cy="5896440"/>
+            <a:chOff x="-35386920" y="-23590440"/>
+            <a:chExt cx="11794680" cy="5896440"/>
           </a:xfrm>
         </p:grpSpPr>
         <p:pic>
           <p:nvPicPr>
-            <p:cNvPr id="45" name="" descr=""/>
+            <p:cNvPr id="47" name="" descr=""/>
             <p:cNvPicPr/>
             <p:nvPr/>
           </p:nvPicPr>
@@ -2943,8 +2952,8 @@
           </p:blipFill>
           <p:spPr>
             <a:xfrm rot="10800000">
-              <a:off x="-35387280" y="-23590800"/>
-              <a:ext cx="11795040" cy="5896800"/>
+              <a:off x="-35386920" y="-23590440"/>
+              <a:ext cx="11794680" cy="5896440"/>
             </a:xfrm>
             <a:prstGeom prst="rect">
               <a:avLst/>
@@ -2957,7 +2966,7 @@
       </p:grpSp>
       <p:pic>
         <p:nvPicPr>
-          <p:cNvPr id="46" name="" descr=""/>
+          <p:cNvPr id="48" name="" descr=""/>
           <p:cNvPicPr/>
           <p:nvPr/>
         </p:nvPicPr>
@@ -2967,8 +2976,8 @@
         </p:blipFill>
         <p:spPr>
           <a:xfrm>
-            <a:off x="11155680" y="24323040"/>
-            <a:ext cx="10880640" cy="8406720"/>
+            <a:off x="15357600" y="30385080"/>
+            <a:ext cx="13279680" cy="4374360"/>
           </a:xfrm>
           <a:prstGeom prst="rect">
             <a:avLst/>
@@ -2980,7 +2989,7 @@
       </p:pic>
       <p:pic>
         <p:nvPicPr>
-          <p:cNvPr id="47" name="" descr=""/>
+          <p:cNvPr id="49" name="" descr=""/>
           <p:cNvPicPr/>
           <p:nvPr/>
         </p:nvPicPr>
@@ -2990,8 +2999,8 @@
         </p:blipFill>
         <p:spPr>
           <a:xfrm>
-            <a:off x="22057560" y="24404760"/>
-            <a:ext cx="10274400" cy="8125920"/>
+            <a:off x="402840" y="35907840"/>
+            <a:ext cx="10057320" cy="5576760"/>
           </a:xfrm>
           <a:prstGeom prst="rect">
             <a:avLst/>
@@ -3003,7 +3012,7 @@
       </p:pic>
       <p:pic>
         <p:nvPicPr>
-          <p:cNvPr id="48" name="" descr=""/>
+          <p:cNvPr id="50" name="" descr=""/>
           <p:cNvPicPr/>
           <p:nvPr/>
         </p:nvPicPr>
@@ -3013,82 +3022,8 @@
         </p:blipFill>
         <p:spPr>
           <a:xfrm>
-            <a:off x="15575040" y="19801800"/>
-            <a:ext cx="13280040" cy="4374720"/>
-          </a:xfrm>
-          <a:prstGeom prst="rect">
-            <a:avLst/>
-          </a:prstGeom>
-          <a:ln>
-            <a:noFill/>
-          </a:ln>
-        </p:spPr>
-      </p:pic>
-      <p:sp>
-        <p:nvSpPr>
-          <p:cNvPr id="49" name="CustomShape 9"/>
-          <p:cNvSpPr/>
-          <p:nvPr/>
-        </p:nvSpPr>
-        <p:spPr>
-          <a:xfrm>
-            <a:off x="-54360" y="34035480"/>
-            <a:ext cx="32917680" cy="699120"/>
-          </a:xfrm>
-          <a:prstGeom prst="rect">
-            <a:avLst/>
-          </a:prstGeom>
-          <a:noFill/>
-          <a:ln>
-            <a:noFill/>
-          </a:ln>
-        </p:spPr>
-        <p:style>
-          <a:lnRef idx="0"/>
-          <a:fillRef idx="0"/>
-          <a:effectRef idx="0"/>
-          <a:fontRef idx="minor"/>
-        </p:style>
-        <p:txBody>
-          <a:bodyPr lIns="90000" rIns="90000" tIns="45000" bIns="45000">
-            <a:spAutoFit/>
-          </a:bodyPr>
-          <a:p>
-            <a:pPr algn="ctr">
-              <a:lnSpc>
-                <a:spcPct val="100000"/>
-              </a:lnSpc>
-            </a:pPr>
-            <a:r>
-              <a:rPr b="1" lang="en-US" sz="4000" spc="-1" strike="noStrike" cap="all">
-                <a:solidFill>
-                  <a:srgbClr val="a80432"/>
-                </a:solidFill>
-                <a:latin typeface="Arial"/>
-                <a:ea typeface="DejaVu Sans"/>
-              </a:rPr>
-              <a:t>Livestock health effects</a:t>
-            </a:r>
-            <a:endParaRPr b="0" lang="en-US" sz="4000" spc="-1" strike="noStrike">
-              <a:latin typeface="Arial"/>
-            </a:endParaRPr>
-          </a:p>
-        </p:txBody>
-      </p:sp>
-      <p:pic>
-        <p:nvPicPr>
-          <p:cNvPr id="50" name="" descr=""/>
-          <p:cNvPicPr/>
-          <p:nvPr/>
-        </p:nvPicPr>
-        <p:blipFill>
-          <a:blip r:embed="rId6"/>
-          <a:stretch/>
-        </p:blipFill>
-        <p:spPr>
-          <a:xfrm>
-            <a:off x="402840" y="35717400"/>
-            <a:ext cx="10057680" cy="5577120"/>
+            <a:off x="11338560" y="35869680"/>
+            <a:ext cx="10057320" cy="5576760"/>
           </a:xfrm>
           <a:prstGeom prst="rect">
             <a:avLst/>
@@ -3105,13 +3040,13 @@
           <p:nvPr/>
         </p:nvPicPr>
         <p:blipFill>
-          <a:blip r:embed="rId7"/>
+          <a:blip r:embed="rId6"/>
           <a:stretch/>
         </p:blipFill>
         <p:spPr>
           <a:xfrm>
-            <a:off x="11338560" y="35651880"/>
-            <a:ext cx="10057680" cy="5577120"/>
+            <a:off x="22101480" y="35777880"/>
+            <a:ext cx="10057320" cy="5576760"/>
           </a:xfrm>
           <a:prstGeom prst="rect">
             <a:avLst/>
@@ -3121,57 +3056,34 @@
           </a:ln>
         </p:spPr>
       </p:pic>
-      <p:pic>
-        <p:nvPicPr>
-          <p:cNvPr id="52" name="" descr=""/>
-          <p:cNvPicPr/>
-          <p:nvPr/>
-        </p:nvPicPr>
-        <p:blipFill>
-          <a:blip r:embed="rId8"/>
-          <a:stretch/>
-        </p:blipFill>
-        <p:spPr>
-          <a:xfrm>
-            <a:off x="22101480" y="35587440"/>
-            <a:ext cx="10057680" cy="5577120"/>
-          </a:xfrm>
-          <a:prstGeom prst="rect">
-            <a:avLst/>
-          </a:prstGeom>
-          <a:ln>
-            <a:noFill/>
-          </a:ln>
-        </p:spPr>
-      </p:pic>
       <p:grpSp>
         <p:nvGrpSpPr>
-          <p:cNvPr id="53" name="Group 10"/>
+          <p:cNvPr id="52" name="Group 9"/>
           <p:cNvGrpSpPr/>
           <p:nvPr/>
         </p:nvGrpSpPr>
         <p:grpSpPr>
           <a:xfrm>
             <a:off x="20574000" y="8503920"/>
-            <a:ext cx="2959920" cy="1156320"/>
+            <a:ext cx="2959560" cy="1155960"/>
             <a:chOff x="20574000" y="8503920"/>
-            <a:chExt cx="2959920" cy="1156320"/>
+            <a:chExt cx="2959560" cy="1155960"/>
           </a:xfrm>
         </p:grpSpPr>
         <p:pic>
           <p:nvPicPr>
-            <p:cNvPr id="54" name="" descr=""/>
+            <p:cNvPr id="53" name="" descr=""/>
             <p:cNvPicPr/>
             <p:nvPr/>
           </p:nvPicPr>
           <p:blipFill>
-            <a:blip r:embed="rId9"/>
+            <a:blip r:embed="rId7"/>
             <a:stretch/>
           </p:blipFill>
           <p:spPr>
             <a:xfrm>
               <a:off x="20574000" y="8503920"/>
-              <a:ext cx="2959920" cy="1156320"/>
+              <a:ext cx="2959560" cy="1155960"/>
             </a:xfrm>
             <a:prstGeom prst="rect">
               <a:avLst/>
@@ -3184,32 +3096,32 @@
       </p:grpSp>
       <p:grpSp>
         <p:nvGrpSpPr>
-          <p:cNvPr id="55" name="Group 11"/>
+          <p:cNvPr id="54" name="Group 10"/>
           <p:cNvGrpSpPr/>
           <p:nvPr/>
         </p:nvGrpSpPr>
         <p:grpSpPr>
           <a:xfrm>
             <a:off x="20466000" y="10241640"/>
-            <a:ext cx="2695320" cy="911160"/>
+            <a:ext cx="2694960" cy="910800"/>
             <a:chOff x="20466000" y="10241640"/>
-            <a:chExt cx="2695320" cy="911160"/>
+            <a:chExt cx="2694960" cy="910800"/>
           </a:xfrm>
         </p:grpSpPr>
         <p:pic>
           <p:nvPicPr>
-            <p:cNvPr id="56" name="" descr=""/>
+            <p:cNvPr id="55" name="" descr=""/>
             <p:cNvPicPr/>
             <p:nvPr/>
           </p:nvPicPr>
           <p:blipFill>
-            <a:blip r:embed="rId10"/>
+            <a:blip r:embed="rId8"/>
             <a:stretch/>
           </p:blipFill>
           <p:spPr>
             <a:xfrm>
               <a:off x="20466000" y="10241640"/>
-              <a:ext cx="2695320" cy="911160"/>
+              <a:ext cx="2694960" cy="910800"/>
             </a:xfrm>
             <a:prstGeom prst="rect">
               <a:avLst/>
@@ -3222,32 +3134,32 @@
       </p:grpSp>
       <p:grpSp>
         <p:nvGrpSpPr>
-          <p:cNvPr id="57" name="Group 12"/>
+          <p:cNvPr id="56" name="Group 11"/>
           <p:cNvGrpSpPr/>
           <p:nvPr/>
         </p:nvGrpSpPr>
         <p:grpSpPr>
           <a:xfrm>
-            <a:off x="19117800" y="15061320"/>
-            <a:ext cx="5936400" cy="403560"/>
-            <a:chOff x="19117800" y="15061320"/>
-            <a:chExt cx="5936400" cy="403560"/>
+            <a:off x="19237320" y="25731360"/>
+            <a:ext cx="5936040" cy="403200"/>
+            <a:chOff x="19237320" y="25731360"/>
+            <a:chExt cx="5936040" cy="403200"/>
           </a:xfrm>
         </p:grpSpPr>
         <p:pic>
           <p:nvPicPr>
-            <p:cNvPr id="58" name="" descr=""/>
+            <p:cNvPr id="57" name="" descr=""/>
             <p:cNvPicPr/>
             <p:nvPr/>
           </p:nvPicPr>
           <p:blipFill>
-            <a:blip r:embed="rId11"/>
+            <a:blip r:embed="rId9"/>
             <a:stretch/>
           </p:blipFill>
           <p:spPr>
             <a:xfrm>
-              <a:off x="19117800" y="15061320"/>
-              <a:ext cx="5936400" cy="403560"/>
+              <a:off x="19237320" y="25731360"/>
+              <a:ext cx="5936040" cy="403200"/>
             </a:xfrm>
             <a:prstGeom prst="rect">
               <a:avLst/>
@@ -3258,6 +3170,499 @@
           </p:spPr>
         </p:pic>
       </p:grpSp>
+      <p:sp>
+        <p:nvSpPr>
+          <p:cNvPr id="58" name="TextShape 12"/>
+          <p:cNvSpPr txBox="1"/>
+          <p:nvPr/>
+        </p:nvSpPr>
+        <p:spPr>
+          <a:xfrm>
+            <a:off x="11612880" y="24597360"/>
+            <a:ext cx="20756880" cy="5103360"/>
+          </a:xfrm>
+          <a:prstGeom prst="rect">
+            <a:avLst/>
+          </a:prstGeom>
+          <a:noFill/>
+          <a:ln>
+            <a:noFill/>
+          </a:ln>
+        </p:spPr>
+        <p:txBody>
+          <a:bodyPr lIns="90000" rIns="90000" tIns="45000" bIns="45000">
+            <a:spAutoFit/>
+          </a:bodyPr>
+          <a:p>
+            <a:pPr algn="ctr">
+              <a:lnSpc>
+                <a:spcPts val="2999"/>
+              </a:lnSpc>
+              <a:spcBef>
+                <a:spcPts val="1800"/>
+              </a:spcBef>
+            </a:pPr>
+            <a:r>
+              <a:rPr b="0" lang="en-US" sz="3000" spc="-1" strike="noStrike" cap="all">
+                <a:solidFill>
+                  <a:srgbClr val="a80432"/>
+                </a:solidFill>
+                <a:latin typeface="Times New Roman"/>
+                <a:ea typeface="DejaVu Sans"/>
+              </a:rPr>
+              <a:t>Livestock illness effects on nutrient shadow prices</a:t>
+            </a:r>
+            <a:endParaRPr b="0" lang="en-US" sz="3000" spc="-1" strike="noStrike">
+              <a:latin typeface="Arial"/>
+            </a:endParaRPr>
+          </a:p>
+          <a:p>
+            <a:pPr algn="ctr">
+              <a:lnSpc>
+                <a:spcPts val="2999"/>
+              </a:lnSpc>
+              <a:spcBef>
+                <a:spcPts val="1800"/>
+              </a:spcBef>
+            </a:pPr>
+            <a:endParaRPr b="0" lang="en-US" sz="3000" spc="-1" strike="noStrike">
+              <a:latin typeface="Arial"/>
+            </a:endParaRPr>
+          </a:p>
+          <a:p>
+            <a:pPr>
+              <a:lnSpc>
+                <a:spcPts val="2999"/>
+              </a:lnSpc>
+              <a:spcBef>
+                <a:spcPts val="1800"/>
+              </a:spcBef>
+            </a:pPr>
+            <a:endParaRPr b="0" lang="en-US" sz="3000" spc="-1" strike="noStrike">
+              <a:latin typeface="Arial"/>
+            </a:endParaRPr>
+          </a:p>
+          <a:p>
+            <a:pPr>
+              <a:lnSpc>
+                <a:spcPts val="2999"/>
+              </a:lnSpc>
+              <a:spcBef>
+                <a:spcPts val="1800"/>
+              </a:spcBef>
+            </a:pPr>
+            <a:endParaRPr b="0" lang="en-US" sz="3000" spc="-1" strike="noStrike">
+              <a:latin typeface="Arial"/>
+            </a:endParaRPr>
+          </a:p>
+          <a:p>
+            <a:pPr marL="216000" indent="-216000">
+              <a:lnSpc>
+                <a:spcPts val="2999"/>
+              </a:lnSpc>
+              <a:spcBef>
+                <a:spcPts val="1800"/>
+              </a:spcBef>
+              <a:buClr>
+                <a:srgbClr val="000000"/>
+              </a:buClr>
+              <a:buSzPct val="45000"/>
+              <a:buFont typeface="Wingdings" charset="2"/>
+              <a:buChar char=""/>
+            </a:pPr>
+            <a:r>
+              <a:rPr b="0" i="1" lang="en-US" sz="2600" spc="-1" strike="noStrike">
+                <a:solidFill>
+                  <a:srgbClr val="231f20"/>
+                </a:solidFill>
+                <a:latin typeface="Times New Roman"/>
+                <a:ea typeface="DejaVu Sans"/>
+              </a:rPr>
+              <a:t>L</a:t>
+            </a:r>
+            <a:r>
+              <a:rPr b="0" lang="en-US" sz="2600" spc="-1" strike="noStrike">
+                <a:solidFill>
+                  <a:srgbClr val="231f20"/>
+                </a:solidFill>
+                <a:latin typeface="Times New Roman"/>
+                <a:ea typeface="DejaVu Sans"/>
+              </a:rPr>
+              <a:t> represents village </a:t>
+            </a:r>
+            <a:r>
+              <a:rPr b="0" i="1" lang="en-US" sz="2600" spc="-1" strike="noStrike">
+                <a:solidFill>
+                  <a:srgbClr val="231f20"/>
+                </a:solidFill>
+                <a:latin typeface="Times New Roman"/>
+                <a:ea typeface="DejaVu Sans"/>
+              </a:rPr>
+              <a:t>v</a:t>
+            </a:r>
+            <a:r>
+              <a:rPr b="0" lang="en-US" sz="2600" spc="-1" strike="noStrike">
+                <a:solidFill>
+                  <a:srgbClr val="231f20"/>
+                </a:solidFill>
+                <a:latin typeface="Times New Roman"/>
+                <a:ea typeface="DejaVu Sans"/>
+              </a:rPr>
+              <a:t> average livestock illness occurrence in month </a:t>
+            </a:r>
+            <a:r>
+              <a:rPr b="0" i="1" lang="en-US" sz="2600" spc="-1" strike="noStrike">
+                <a:solidFill>
+                  <a:srgbClr val="231f20"/>
+                </a:solidFill>
+                <a:latin typeface="Times New Roman"/>
+                <a:ea typeface="DejaVu Sans"/>
+              </a:rPr>
+              <a:t>m</a:t>
+            </a:r>
+            <a:endParaRPr b="0" lang="en-US" sz="2600" spc="-1" strike="noStrike">
+              <a:latin typeface="Arial"/>
+            </a:endParaRPr>
+          </a:p>
+          <a:p>
+            <a:pPr marL="216000" indent="-216000">
+              <a:lnSpc>
+                <a:spcPts val="2999"/>
+              </a:lnSpc>
+              <a:spcBef>
+                <a:spcPts val="1800"/>
+              </a:spcBef>
+              <a:buClr>
+                <a:srgbClr val="000000"/>
+              </a:buClr>
+              <a:buSzPct val="45000"/>
+              <a:buFont typeface="Wingdings" charset="2"/>
+              <a:buChar char=""/>
+            </a:pPr>
+            <a:r>
+              <a:rPr b="0" i="1" lang="en-US" sz="2600" spc="-1" strike="noStrike">
+                <a:solidFill>
+                  <a:srgbClr val="231f20"/>
+                </a:solidFill>
+                <a:latin typeface="Times New Roman"/>
+                <a:ea typeface="DejaVu Sans"/>
+              </a:rPr>
+              <a:t>THM</a:t>
+            </a:r>
+            <a:r>
+              <a:rPr b="0" lang="en-US" sz="2600" spc="-1" strike="noStrike">
+                <a:solidFill>
+                  <a:srgbClr val="231f20"/>
+                </a:solidFill>
+                <a:latin typeface="Times New Roman"/>
+                <a:ea typeface="DejaVu Sans"/>
+              </a:rPr>
+              <a:t> represents total household members in household </a:t>
+            </a:r>
+            <a:r>
+              <a:rPr b="0" i="1" lang="en-US" sz="2600" spc="-1" strike="noStrike">
+                <a:solidFill>
+                  <a:srgbClr val="231f20"/>
+                </a:solidFill>
+                <a:latin typeface="Times New Roman"/>
+                <a:ea typeface="DejaVu Sans"/>
+              </a:rPr>
+              <a:t>h</a:t>
+            </a:r>
+            <a:endParaRPr b="0" lang="en-US" sz="2600" spc="-1" strike="noStrike">
+              <a:latin typeface="Arial"/>
+            </a:endParaRPr>
+          </a:p>
+          <a:p>
+            <a:pPr marL="216000" indent="-216000">
+              <a:lnSpc>
+                <a:spcPts val="2999"/>
+              </a:lnSpc>
+              <a:spcBef>
+                <a:spcPts val="1800"/>
+              </a:spcBef>
+              <a:buClr>
+                <a:srgbClr val="000000"/>
+              </a:buClr>
+              <a:buSzPct val="45000"/>
+              <a:buFont typeface="Wingdings" charset="2"/>
+              <a:buChar char=""/>
+            </a:pPr>
+            <a:r>
+              <a:rPr b="0" i="1" lang="en-US" sz="2600" spc="-1" strike="noStrike">
+                <a:solidFill>
+                  <a:srgbClr val="231f20"/>
+                </a:solidFill>
+                <a:latin typeface="Times New Roman"/>
+                <a:ea typeface="Times New Roman"/>
+              </a:rPr>
+              <a:t>ε </a:t>
+            </a:r>
+            <a:r>
+              <a:rPr b="0" lang="en-US" sz="2600" spc="-1" strike="noStrike">
+                <a:solidFill>
+                  <a:srgbClr val="231f20"/>
+                </a:solidFill>
+                <a:latin typeface="Times New Roman"/>
+                <a:ea typeface="Times New Roman"/>
+              </a:rPr>
+              <a:t>represent the stochastic error component for household </a:t>
+            </a:r>
+            <a:r>
+              <a:rPr b="0" i="1" lang="en-US" sz="2600" spc="-1" strike="noStrike">
+                <a:solidFill>
+                  <a:srgbClr val="231f20"/>
+                </a:solidFill>
+                <a:latin typeface="Times New Roman"/>
+                <a:ea typeface="Times New Roman"/>
+              </a:rPr>
+              <a:t>h</a:t>
+            </a:r>
+            <a:endParaRPr b="0" lang="en-US" sz="2600" spc="-1" strike="noStrike">
+              <a:latin typeface="Arial"/>
+            </a:endParaRPr>
+          </a:p>
+          <a:p>
+            <a:pPr marL="216000" indent="-216000">
+              <a:lnSpc>
+                <a:spcPts val="2999"/>
+              </a:lnSpc>
+              <a:spcBef>
+                <a:spcPts val="1800"/>
+              </a:spcBef>
+              <a:buClr>
+                <a:srgbClr val="000000"/>
+              </a:buClr>
+              <a:buSzPct val="45000"/>
+              <a:buFont typeface="Wingdings" charset="2"/>
+              <a:buChar char=""/>
+            </a:pPr>
+            <a:r>
+              <a:rPr b="0" i="1" lang="en-US" sz="2600" spc="-1" strike="noStrike">
+                <a:solidFill>
+                  <a:srgbClr val="231f20"/>
+                </a:solidFill>
+                <a:latin typeface="Times New Roman"/>
+                <a:ea typeface="Times New Roman"/>
+              </a:rPr>
+              <a:t>β</a:t>
+            </a:r>
+            <a:r>
+              <a:rPr b="0" i="1" lang="en-US" sz="2600" spc="-1" strike="noStrike" baseline="-33000">
+                <a:solidFill>
+                  <a:srgbClr val="231f20"/>
+                </a:solidFill>
+                <a:latin typeface="Times New Roman"/>
+                <a:ea typeface="Times New Roman"/>
+              </a:rPr>
+              <a:t>1</a:t>
+            </a:r>
+            <a:r>
+              <a:rPr b="0" i="1" lang="en-US" sz="2600" spc="-1" strike="noStrike">
+                <a:solidFill>
+                  <a:srgbClr val="231f20"/>
+                </a:solidFill>
+                <a:latin typeface="Times New Roman"/>
+                <a:ea typeface="Times New Roman"/>
+              </a:rPr>
+              <a:t> </a:t>
+            </a:r>
+            <a:r>
+              <a:rPr b="0" lang="en-US" sz="2600" spc="-1" strike="noStrike">
+                <a:solidFill>
+                  <a:srgbClr val="231f20"/>
+                </a:solidFill>
+                <a:latin typeface="Times New Roman"/>
+                <a:ea typeface="Times New Roman"/>
+              </a:rPr>
+              <a:t>represents the estimable parameter of interest for livestock health effects on the shadow price </a:t>
+            </a:r>
+            <a:r>
+              <a:rPr b="0" i="1" lang="en-US" sz="2600" spc="-1" strike="noStrike">
+                <a:solidFill>
+                  <a:srgbClr val="231f20"/>
+                </a:solidFill>
+                <a:latin typeface="Times New Roman"/>
+                <a:ea typeface="Times New Roman"/>
+              </a:rPr>
+              <a:t>P</a:t>
+            </a:r>
+            <a:r>
+              <a:rPr b="0" lang="en-US" sz="2600" spc="-1" strike="noStrike" baseline="-33000">
+                <a:solidFill>
+                  <a:srgbClr val="231f20"/>
+                </a:solidFill>
+                <a:latin typeface="Times New Roman"/>
+                <a:ea typeface="Times New Roman"/>
+              </a:rPr>
+              <a:t>n,h</a:t>
+            </a:r>
+            <a:r>
+              <a:rPr b="0" lang="en-US" sz="2600" spc="-1" strike="noStrike">
+                <a:solidFill>
+                  <a:srgbClr val="231f20"/>
+                </a:solidFill>
+                <a:latin typeface="Times New Roman"/>
+                <a:ea typeface="Times New Roman"/>
+              </a:rPr>
+              <a:t> for nutrient </a:t>
+            </a:r>
+            <a:r>
+              <a:rPr b="0" i="1" lang="en-US" sz="2600" spc="-1" strike="noStrike">
+                <a:solidFill>
+                  <a:srgbClr val="231f20"/>
+                </a:solidFill>
+                <a:latin typeface="Times New Roman"/>
+                <a:ea typeface="Times New Roman"/>
+              </a:rPr>
+              <a:t>n</a:t>
+            </a:r>
+            <a:r>
+              <a:rPr b="0" lang="en-US" sz="2600" spc="-1" strike="noStrike">
+                <a:solidFill>
+                  <a:srgbClr val="231f20"/>
+                </a:solidFill>
+                <a:latin typeface="Times New Roman"/>
+                <a:ea typeface="Times New Roman"/>
+              </a:rPr>
+              <a:t> in household </a:t>
+            </a:r>
+            <a:r>
+              <a:rPr b="0" i="1" lang="en-US" sz="2600" spc="-1" strike="noStrike">
+                <a:solidFill>
+                  <a:srgbClr val="231f20"/>
+                </a:solidFill>
+                <a:latin typeface="Times New Roman"/>
+                <a:ea typeface="Times New Roman"/>
+              </a:rPr>
+              <a:t>h</a:t>
+            </a:r>
+            <a:endParaRPr b="0" lang="en-US" sz="2600" spc="-1" strike="noStrike">
+              <a:latin typeface="Arial"/>
+            </a:endParaRPr>
+          </a:p>
+          <a:p>
+            <a:pPr marL="216000" indent="-216000">
+              <a:buClr>
+                <a:srgbClr val="000000"/>
+              </a:buClr>
+              <a:buSzPct val="45000"/>
+              <a:buFont typeface="Wingdings" charset="2"/>
+              <a:buChar char=""/>
+            </a:pPr>
+            <a:r>
+              <a:rPr b="0" i="1" lang="en-US" sz="2600" spc="-1" strike="noStrike">
+                <a:solidFill>
+                  <a:srgbClr val="231f20"/>
+                </a:solidFill>
+                <a:latin typeface="Times New Roman"/>
+                <a:ea typeface="Times New Roman"/>
+              </a:rPr>
+              <a:t>Cov(β) </a:t>
+            </a:r>
+            <a:r>
+              <a:rPr b="0" lang="en-US" sz="2600" spc="-1" strike="noStrike">
+                <a:solidFill>
+                  <a:srgbClr val="231f20"/>
+                </a:solidFill>
+                <a:latin typeface="Times New Roman"/>
+                <a:ea typeface="Times New Roman"/>
+              </a:rPr>
+              <a:t>is estimated using the Newey and West (1987) Heteroskedastic and Autocorrelation Consistent Covariance Estimator</a:t>
+            </a:r>
+            <a:endParaRPr b="0" lang="en-US" sz="2600" spc="-1" strike="noStrike">
+              <a:latin typeface="Arial"/>
+            </a:endParaRPr>
+          </a:p>
+        </p:txBody>
+      </p:sp>
+      <p:pic>
+        <p:nvPicPr>
+          <p:cNvPr id="59" name="" descr=""/>
+          <p:cNvPicPr/>
+          <p:nvPr/>
+        </p:nvPicPr>
+        <p:blipFill>
+          <a:blip r:embed="rId10"/>
+          <a:stretch/>
+        </p:blipFill>
+        <p:spPr>
+          <a:xfrm>
+            <a:off x="10881360" y="15361920"/>
+            <a:ext cx="10881360" cy="8403480"/>
+          </a:xfrm>
+          <a:prstGeom prst="rect">
+            <a:avLst/>
+          </a:prstGeom>
+          <a:ln>
+            <a:noFill/>
+          </a:ln>
+        </p:spPr>
+      </p:pic>
+      <p:pic>
+        <p:nvPicPr>
+          <p:cNvPr id="60" name="" descr=""/>
+          <p:cNvPicPr/>
+          <p:nvPr/>
+        </p:nvPicPr>
+        <p:blipFill>
+          <a:blip r:embed="rId11"/>
+          <a:stretch/>
+        </p:blipFill>
+        <p:spPr>
+          <a:xfrm>
+            <a:off x="21671280" y="15307560"/>
+            <a:ext cx="10881360" cy="8174880"/>
+          </a:xfrm>
+          <a:prstGeom prst="rect">
+            <a:avLst/>
+          </a:prstGeom>
+          <a:ln>
+            <a:noFill/>
+          </a:ln>
+        </p:spPr>
+      </p:pic>
+      <p:sp>
+        <p:nvSpPr>
+          <p:cNvPr id="61" name="TextShape 13"/>
+          <p:cNvSpPr txBox="1"/>
+          <p:nvPr/>
+        </p:nvSpPr>
+        <p:spPr>
+          <a:xfrm>
+            <a:off x="11567160" y="13933800"/>
+            <a:ext cx="20985480" cy="731520"/>
+          </a:xfrm>
+          <a:prstGeom prst="rect">
+            <a:avLst/>
+          </a:prstGeom>
+          <a:noFill/>
+          <a:ln>
+            <a:noFill/>
+          </a:ln>
+        </p:spPr>
+        <p:txBody>
+          <a:bodyPr lIns="90000" rIns="90000" tIns="45000" bIns="45000">
+            <a:spAutoFit/>
+          </a:bodyPr>
+          <a:p>
+            <a:pPr algn="ctr"/>
+            <a:r>
+              <a:rPr b="1" lang="en-US" sz="4000" spc="-1" strike="noStrike" cap="all">
+                <a:solidFill>
+                  <a:srgbClr val="a80432"/>
+                </a:solidFill>
+                <a:latin typeface="Arial"/>
+                <a:ea typeface="DejaVu Sans"/>
+              </a:rPr>
+              <a:t>Results</a:t>
+            </a:r>
+            <a:endParaRPr b="0" lang="en-US" sz="4000" spc="-1" strike="noStrike">
+              <a:latin typeface="Arial"/>
+            </a:endParaRPr>
+          </a:p>
+        </p:txBody>
+      </p:sp>
     </p:spTree>
   </p:cSld>
   <mc:AlternateContent>

</xml_diff>